<commit_message>
add code and docs
</commit_message>
<xml_diff>
--- a/Task 1/#2 presentation.pptx
+++ b/Task 1/#2 presentation.pptx
@@ -224,7 +224,7 @@
           <a:p>
             <a:fld id="{FD913024-4032-4B4F-8680-09D5E08EDB6E}" type="datetimeFigureOut">
               <a:rPr lang="en-US" smtClean="0"/>
-              <a:t>5/26/2024</a:t>
+              <a:t>5/29/2024</a:t>
             </a:fld>
             <a:endParaRPr lang="en-US" dirty="0"/>
           </a:p>
@@ -401,7 +401,7 @@
           <a:p>
             <a:fld id="{F2AE225E-43E0-7047-8ADB-DD9EBB41B4D0}" type="datetimeFigureOut">
               <a:rPr lang="en-US" noProof="0" smtClean="0"/>
-              <a:t>5/26/2024</a:t>
+              <a:t>5/29/2024</a:t>
             </a:fld>
             <a:endParaRPr lang="en-US" noProof="0" dirty="0"/>
           </a:p>
@@ -27389,8 +27389,8 @@
         </p:nvSpPr>
         <p:spPr>
           <a:xfrm>
-            <a:off x="3631475" y="914400"/>
-            <a:ext cx="5641848" cy="5029200"/>
+            <a:off x="3275076" y="2899954"/>
+            <a:ext cx="5641848" cy="1336766"/>
           </a:xfrm>
         </p:spPr>
         <p:txBody>
@@ -27534,23 +27534,7 @@
                   <a:schemeClr val="tx1"/>
                 </a:solidFill>
               </a:rPr>
-              <a:t>++ is able to learn deep point set </a:t>
-            </a:r>
-            <a:r>
-              <a:rPr lang="en-US" sz="2400" dirty="0" err="1">
-                <a:solidFill>
-                  <a:schemeClr val="tx1"/>
-                </a:solidFill>
-              </a:rPr>
-              <a:t>featires</a:t>
-            </a:r>
-            <a:r>
-              <a:rPr lang="en-US" sz="2400" dirty="0">
-                <a:solidFill>
-                  <a:schemeClr val="tx1"/>
-                </a:solidFill>
-              </a:rPr>
-              <a:t> efficiently and robustly</a:t>
+              <a:t>++ is able to learn deep point set features efficiently and robustly</a:t>
             </a:r>
             <a:br>
               <a:rPr lang="en-US" sz="2400" dirty="0">
@@ -27652,7 +27636,12 @@
             <p:ph type="title"/>
           </p:nvPr>
         </p:nvSpPr>
-        <p:spPr/>
+        <p:spPr>
+          <a:xfrm>
+            <a:off x="914399" y="539932"/>
+            <a:ext cx="7534656" cy="914400"/>
+          </a:xfrm>
+        </p:spPr>
         <p:txBody>
           <a:bodyPr/>
           <a:lstStyle/>
@@ -27683,13 +27672,13 @@
         </p:nvSpPr>
         <p:spPr>
           <a:xfrm>
-            <a:off x="914399" y="2039111"/>
-            <a:ext cx="10014857" cy="4370398"/>
+            <a:off x="914399" y="1724297"/>
+            <a:ext cx="10014857" cy="4685212"/>
           </a:xfrm>
         </p:spPr>
         <p:txBody>
           <a:bodyPr>
-            <a:normAutofit lnSpcReduction="10000"/>
+            <a:normAutofit/>
           </a:bodyPr>
           <a:lstStyle/>
           <a:p>
@@ -27888,37 +27877,8 @@
         </p:blipFill>
         <p:spPr>
           <a:xfrm>
-            <a:off x="697026" y="2111501"/>
-            <a:ext cx="6467475" cy="3695700"/>
-          </a:xfrm>
-        </p:spPr>
-      </p:pic>
-      <p:pic>
-        <p:nvPicPr>
-          <p:cNvPr id="8" name="Content Placeholder 7">
-            <a:extLst>
-              <a:ext uri="{FF2B5EF4-FFF2-40B4-BE49-F238E27FC236}">
-                <a16:creationId xmlns:a16="http://schemas.microsoft.com/office/drawing/2014/main" id="{DBDFAB7B-AAD8-67D5-04DB-FE76E0B8F308}"/>
-              </a:ext>
-            </a:extLst>
-          </p:cNvPr>
-          <p:cNvPicPr>
-            <a:picLocks noGrp="1" noChangeAspect="1"/>
-          </p:cNvPicPr>
-          <p:nvPr>
-            <p:ph sz="quarter" idx="12"/>
-          </p:nvPr>
-        </p:nvPicPr>
-        <p:blipFill>
-          <a:blip r:embed="rId4"/>
-          <a:stretch>
-            <a:fillRect/>
-          </a:stretch>
-        </p:blipFill>
-        <p:spPr>
-          <a:xfrm>
-            <a:off x="7289067" y="3121572"/>
-            <a:ext cx="4472010" cy="2239439"/>
+            <a:off x="3217994" y="2307771"/>
+            <a:ext cx="5346761" cy="3055292"/>
           </a:xfrm>
         </p:spPr>
       </p:pic>
@@ -28261,15 +28221,7 @@
           <a:p>
             <a:r>
               <a:rPr lang="en-US" dirty="0"/>
-              <a:t>3. Multi-</a:t>
-            </a:r>
-            <a:r>
-              <a:rPr lang="en-US" dirty="0" err="1"/>
-              <a:t>Sclae</a:t>
-            </a:r>
-            <a:r>
-              <a:rPr lang="en-US" dirty="0"/>
-              <a:t> Grouping (MSG) and Multi-Resolution Grouping (MRG):</a:t>
+              <a:t>3. Multi-Scale Grouping (MSG) and Multi-Resolution Grouping (MRG):</a:t>
             </a:r>
           </a:p>
           <a:p>
@@ -29836,6 +29788,15 @@
 </file>
 
 <file path=customXml/item1.xml><?xml version="1.0" encoding="utf-8"?>
+<?mso-contentType ?>
+<FormTemplates xmlns="http://schemas.microsoft.com/sharepoint/v3/contenttype/forms">
+  <Display>DocumentLibraryForm</Display>
+  <Edit>DocumentLibraryForm</Edit>
+  <New>DocumentLibraryForm</New>
+</FormTemplates>
+</file>
+
+<file path=customXml/item2.xml><?xml version="1.0" encoding="utf-8"?>
 <p:properties xmlns:p="http://schemas.microsoft.com/office/2006/metadata/properties" xmlns:xsi="http://www.w3.org/2001/XMLSchema-instance" xmlns:pc="http://schemas.microsoft.com/office/infopath/2007/PartnerControls">
   <documentManagement>
     <_ip_UnifiedCompliancePolicyUIAction xmlns="http://schemas.microsoft.com/sharepoint/v3" xsi:nil="true"/>
@@ -29853,15 +29814,6 @@
     <MediaServiceKeyPoints xmlns="71af3243-3dd4-4a8d-8c0d-dd76da1f02a5" xsi:nil="true"/>
   </documentManagement>
 </p:properties>
-</file>
-
-<file path=customXml/item2.xml><?xml version="1.0" encoding="utf-8"?>
-<?mso-contentType ?>
-<FormTemplates xmlns="http://schemas.microsoft.com/sharepoint/v3/contenttype/forms">
-  <Display>DocumentLibraryForm</Display>
-  <Edit>DocumentLibraryForm</Edit>
-  <New>DocumentLibraryForm</New>
-</FormTemplates>
 </file>
 
 <file path=customXml/item3.xml><?xml version="1.0" encoding="utf-8"?>
@@ -30177,6 +30129,14 @@
 </file>
 
 <file path=customXml/itemProps1.xml><?xml version="1.0" encoding="utf-8"?>
+<ds:datastoreItem xmlns:ds="http://schemas.openxmlformats.org/officeDocument/2006/customXml" ds:itemID="{1249AD37-9510-4A2D-B790-12C439A83F93}">
+  <ds:schemaRefs>
+    <ds:schemaRef ds:uri="http://schemas.microsoft.com/sharepoint/v3/contenttype/forms"/>
+  </ds:schemaRefs>
+</ds:datastoreItem>
+</file>
+
+<file path=customXml/itemProps2.xml><?xml version="1.0" encoding="utf-8"?>
 <ds:datastoreItem xmlns:ds="http://schemas.openxmlformats.org/officeDocument/2006/customXml" ds:itemID="{85DF9CEC-52C2-4D14-B2F5-11176002A8B6}">
   <ds:schemaRefs>
     <ds:schemaRef ds:uri="http://schemas.microsoft.com/office/2006/metadata/properties"/>
@@ -30184,14 +30144,6 @@
     <ds:schemaRef ds:uri="http://schemas.microsoft.com/sharepoint/v3"/>
     <ds:schemaRef ds:uri="71af3243-3dd4-4a8d-8c0d-dd76da1f02a5"/>
     <ds:schemaRef ds:uri="230e9df3-be65-4c73-a93b-d1236ebd677e"/>
-  </ds:schemaRefs>
-</ds:datastoreItem>
-</file>
-
-<file path=customXml/itemProps2.xml><?xml version="1.0" encoding="utf-8"?>
-<ds:datastoreItem xmlns:ds="http://schemas.openxmlformats.org/officeDocument/2006/customXml" ds:itemID="{1249AD37-9510-4A2D-B790-12C439A83F93}">
-  <ds:schemaRefs>
-    <ds:schemaRef ds:uri="http://schemas.microsoft.com/sharepoint/v3/contenttype/forms"/>
   </ds:schemaRefs>
 </ds:datastoreItem>
 </file>

</xml_diff>